<commit_message>
fix presentation i guess?
</commit_message>
<xml_diff>
--- a/media/presentation.pptx
+++ b/media/presentation.pptx
@@ -4154,13 +4154,19 @@
                 <a:spcPct val="100000"/>
               </a:lnSpc>
             </a:pPr>
-            <a:fld id="{AD9FA5FD-63D4-478E-A2A5-A7E4A3E7CE13}" type="author">
+            <a:fld id="{5F17335E-5DC9-41DB-846F-ED800A5E11B2}" type="author">
               <a:rPr b="0" lang="ru-RU" sz="1800" spc="-1" strike="noStrike">
+                <a:solidFill>
+                  <a:srgbClr val="eeeeee"/>
+                </a:solidFill>
                 <a:latin typeface="Arial"/>
               </a:rPr>
               <a:t> </a:t>
             </a:fld>
             <a:endParaRPr b="0" lang="ru-RU" sz="1800" spc="-1" strike="noStrike">
+              <a:solidFill>
+                <a:srgbClr val="eeeeee"/>
+              </a:solidFill>
               <a:latin typeface="Arial"/>
             </a:endParaRPr>
           </a:p>
@@ -4615,7 +4621,7 @@
         </p:spPr>
         <p:txBody>
           <a:bodyPr lIns="0" rIns="0" tIns="0" bIns="0">
-            <a:normAutofit fontScale="71000"/>
+            <a:normAutofit fontScale="65000"/>
           </a:bodyPr>
           <a:p>
             <a:pPr marL="432000" indent="-324000">
@@ -4794,7 +4800,7 @@
         </p:spPr>
         <p:txBody>
           <a:bodyPr lIns="0" rIns="0" tIns="0" bIns="0">
-            <a:normAutofit fontScale="71000"/>
+            <a:normAutofit fontScale="65000"/>
           </a:bodyPr>
           <a:p>
             <a:pPr marL="432000" indent="-324000">
@@ -6964,6 +6970,9 @@
               <a:t>Автор: Георгий Пронюк</a:t>
             </a:r>
             <a:endParaRPr b="0" lang="ru-RU" sz="2600" spc="-1" strike="noStrike">
+              <a:solidFill>
+                <a:srgbClr val="eeeeee"/>
+              </a:solidFill>
               <a:latin typeface="Arial"/>
             </a:endParaRPr>
           </a:p>
@@ -6978,11 +6987,17 @@
             </a:pPr>
             <a:r>
               <a:rPr b="0" lang="ru-RU" sz="2600" spc="-1" strike="noStrike">
+                <a:solidFill>
+                  <a:srgbClr val="eeeeee"/>
+                </a:solidFill>
                 <a:latin typeface="Arial"/>
               </a:rPr>
               <a:t> </a:t>
             </a:r>
             <a:endParaRPr b="0" lang="ru-RU" sz="2600" spc="-1" strike="noStrike">
+              <a:solidFill>
+                <a:srgbClr val="eeeeee"/>
+              </a:solidFill>
               <a:latin typeface="Arial"/>
             </a:endParaRPr>
           </a:p>
@@ -7055,11 +7070,17 @@
             </a:pPr>
             <a:r>
               <a:rPr b="0" lang="ru-RU" sz="4400" spc="-1" strike="noStrike">
+                <a:solidFill>
+                  <a:srgbClr val="eeeeee"/>
+                </a:solidFill>
                 <a:latin typeface="Arial"/>
               </a:rPr>
               <a:t>9. Структура</a:t>
             </a:r>
             <a:endParaRPr b="0" lang="ru-RU" sz="4400" spc="-1" strike="noStrike">
+              <a:solidFill>
+                <a:srgbClr val="eeeeee"/>
+              </a:solidFill>
               <a:latin typeface="Arial"/>
             </a:endParaRPr>
           </a:p>
@@ -7111,11 +7132,17 @@
             </a:pPr>
             <a:r>
               <a:rPr b="0" lang="ru-RU" sz="1300" spc="-1" strike="noStrike">
+                <a:solidFill>
+                  <a:srgbClr val="eeeeee"/>
+                </a:solidFill>
                 <a:latin typeface="Arial"/>
               </a:rPr>
               <a:t>Код, ради удобства, разбит на несколько файлов:</a:t>
             </a:r>
             <a:endParaRPr b="0" lang="ru-RU" sz="1300" spc="-1" strike="noStrike">
+              <a:solidFill>
+                <a:srgbClr val="eeeeee"/>
+              </a:solidFill>
               <a:latin typeface="Arial"/>
             </a:endParaRPr>
           </a:p>
@@ -7136,11 +7163,17 @@
             </a:pPr>
             <a:r>
               <a:rPr b="0" lang="ru-RU" sz="1300" spc="-1" strike="noStrike">
+                <a:solidFill>
+                  <a:srgbClr val="eeeeee"/>
+                </a:solidFill>
                 <a:latin typeface="Arial"/>
               </a:rPr>
               <a:t>Main.py — главный скрипт. Используется для запуска приложения.</a:t>
             </a:r>
             <a:endParaRPr b="0" lang="ru-RU" sz="1300" spc="-1" strike="noStrike">
+              <a:solidFill>
+                <a:srgbClr val="eeeeee"/>
+              </a:solidFill>
               <a:latin typeface="Arial"/>
             </a:endParaRPr>
           </a:p>
@@ -7161,11 +7194,17 @@
             </a:pPr>
             <a:r>
               <a:rPr b="0" lang="ru-RU" sz="1300" spc="-1" strike="noStrike">
+                <a:solidFill>
+                  <a:srgbClr val="eeeeee"/>
+                </a:solidFill>
                 <a:latin typeface="Arial"/>
               </a:rPr>
               <a:t>Util.py — разнообразные утилиты, используемые в коде.</a:t>
             </a:r>
             <a:endParaRPr b="0" lang="ru-RU" sz="1300" spc="-1" strike="noStrike">
+              <a:solidFill>
+                <a:srgbClr val="eeeeee"/>
+              </a:solidFill>
               <a:latin typeface="Arial"/>
             </a:endParaRPr>
           </a:p>
@@ -7186,11 +7225,17 @@
             </a:pPr>
             <a:r>
               <a:rPr b="0" lang="ru-RU" sz="1300" spc="-1" strike="noStrike">
+                <a:solidFill>
+                  <a:srgbClr val="eeeeee"/>
+                </a:solidFill>
                 <a:latin typeface="Arial"/>
               </a:rPr>
               <a:t>Database.py — Управление БД. Вся логика, связанная с хранилищем.</a:t>
             </a:r>
             <a:endParaRPr b="0" lang="ru-RU" sz="1300" spc="-1" strike="noStrike">
+              <a:solidFill>
+                <a:srgbClr val="eeeeee"/>
+              </a:solidFill>
               <a:latin typeface="Arial"/>
             </a:endParaRPr>
           </a:p>
@@ -7211,11 +7256,17 @@
             </a:pPr>
             <a:r>
               <a:rPr b="0" lang="ru-RU" sz="1300" spc="-1" strike="noStrike">
+                <a:solidFill>
+                  <a:srgbClr val="eeeeee"/>
+                </a:solidFill>
                 <a:latin typeface="Arial"/>
               </a:rPr>
               <a:t>Api.py — API. Здесь находятся классы, представляющие из себя результаты запросов из БД (Пользователи, Песни, Жанры, Альбомы). С объектами работать удобнее :)</a:t>
             </a:r>
             <a:endParaRPr b="0" lang="ru-RU" sz="1300" spc="-1" strike="noStrike">
+              <a:solidFill>
+                <a:srgbClr val="eeeeee"/>
+              </a:solidFill>
               <a:latin typeface="Arial"/>
             </a:endParaRPr>
           </a:p>
@@ -7236,11 +7287,17 @@
             </a:pPr>
             <a:r>
               <a:rPr b="0" lang="ru-RU" sz="1300" spc="-1" strike="noStrike">
+                <a:solidFill>
+                  <a:srgbClr val="eeeeee"/>
+                </a:solidFill>
                 <a:latin typeface="Arial"/>
               </a:rPr>
               <a:t>Auth.py — Окно авторизации.</a:t>
             </a:r>
             <a:endParaRPr b="0" lang="ru-RU" sz="1300" spc="-1" strike="noStrike">
+              <a:solidFill>
+                <a:srgbClr val="eeeeee"/>
+              </a:solidFill>
               <a:latin typeface="Arial"/>
             </a:endParaRPr>
           </a:p>
@@ -7261,11 +7318,17 @@
             </a:pPr>
             <a:r>
               <a:rPr b="0" lang="ru-RU" sz="1300" spc="-1" strike="noStrike">
+                <a:solidFill>
+                  <a:srgbClr val="eeeeee"/>
+                </a:solidFill>
                 <a:latin typeface="Arial"/>
               </a:rPr>
               <a:t>Album_window.py — Окно проигрывателя альбомов.</a:t>
             </a:r>
             <a:endParaRPr b="0" lang="ru-RU" sz="1300" spc="-1" strike="noStrike">
+              <a:solidFill>
+                <a:srgbClr val="eeeeee"/>
+              </a:solidFill>
               <a:latin typeface="Arial"/>
             </a:endParaRPr>
           </a:p>
@@ -7286,11 +7349,17 @@
             </a:pPr>
             <a:r>
               <a:rPr b="0" lang="ru-RU" sz="1300" spc="-1" strike="noStrike">
+                <a:solidFill>
+                  <a:srgbClr val="eeeeee"/>
+                </a:solidFill>
                 <a:latin typeface="Arial"/>
               </a:rPr>
               <a:t>Album_creation.py — Окно создания альбома.</a:t>
             </a:r>
             <a:endParaRPr b="0" lang="ru-RU" sz="1300" spc="-1" strike="noStrike">
+              <a:solidFill>
+                <a:srgbClr val="eeeeee"/>
+              </a:solidFill>
               <a:latin typeface="Arial"/>
             </a:endParaRPr>
           </a:p>
@@ -7311,11 +7380,17 @@
             </a:pPr>
             <a:r>
               <a:rPr b="0" lang="ru-RU" sz="1300" spc="-1" strike="noStrike">
+                <a:solidFill>
+                  <a:srgbClr val="eeeeee"/>
+                </a:solidFill>
                 <a:latin typeface="Arial"/>
               </a:rPr>
               <a:t>Album_widget.py — Мини-виджет альбома, который отображается в списке.</a:t>
             </a:r>
             <a:endParaRPr b="0" lang="ru-RU" sz="1300" spc="-1" strike="noStrike">
+              <a:solidFill>
+                <a:srgbClr val="eeeeee"/>
+              </a:solidFill>
               <a:latin typeface="Arial"/>
             </a:endParaRPr>
           </a:p>
@@ -7336,11 +7411,17 @@
             </a:pPr>
             <a:r>
               <a:rPr b="0" lang="ru-RU" sz="1300" spc="-1" strike="noStrike">
+                <a:solidFill>
+                  <a:srgbClr val="eeeeee"/>
+                </a:solidFill>
                 <a:latin typeface="Arial"/>
               </a:rPr>
               <a:t>User_window.py — Окна, связанные с профилем пользователя.</a:t>
             </a:r>
             <a:endParaRPr b="0" lang="ru-RU" sz="1300" spc="-1" strike="noStrike">
+              <a:solidFill>
+                <a:srgbClr val="eeeeee"/>
+              </a:solidFill>
               <a:latin typeface="Arial"/>
             </a:endParaRPr>
           </a:p>
@@ -7354,6 +7435,9 @@
               </a:spcBef>
             </a:pPr>
             <a:endParaRPr b="0" lang="ru-RU" sz="1300" spc="-1" strike="noStrike">
+              <a:solidFill>
+                <a:srgbClr val="eeeeee"/>
+              </a:solidFill>
               <a:latin typeface="Arial"/>
             </a:endParaRPr>
           </a:p>
@@ -8337,6 +8421,9 @@
               <a:t>Программа представляет собой приложение с графическим интерфейсом. У каждого пользователя есть аккаунт, в который они могут зайти или зарегистрировать по запуску программы. Любой пользователь сможет загрузить свои альбомы, послушать чужие и даже добавить, не виданный ни кем ранее, свой жанр. Также есть возможность редактировать свой профиль и смотреть страницы других пользователей.</a:t>
             </a:r>
             <a:endParaRPr b="0" lang="ru-RU" sz="2000" spc="-1" strike="noStrike">
+              <a:solidFill>
+                <a:srgbClr val="eeeeee"/>
+              </a:solidFill>
               <a:latin typeface="Arial"/>
             </a:endParaRPr>
           </a:p>
@@ -8706,9 +8793,6 @@
               <a:t>4. Функционал</a:t>
             </a:r>
             <a:endParaRPr b="0" lang="ru-RU" sz="4400" spc="-1" strike="noStrike">
-              <a:solidFill>
-                <a:srgbClr val="eeeeee"/>
-              </a:solidFill>
               <a:latin typeface="Arial"/>
             </a:endParaRPr>
           </a:p>
@@ -8794,9 +8878,6 @@
               <a:t>Авторизация</a:t>
             </a:r>
             <a:endParaRPr b="0" lang="ru-RU" sz="3200" spc="-1" strike="noStrike">
-              <a:solidFill>
-                <a:srgbClr val="eeeeee"/>
-              </a:solidFill>
               <a:latin typeface="Arial"/>
             </a:endParaRPr>
           </a:p>
@@ -8836,9 +8917,6 @@
               <a:t>Главная страница</a:t>
             </a:r>
             <a:endParaRPr b="0" lang="ru-RU" sz="3200" spc="-1" strike="noStrike">
-              <a:solidFill>
-                <a:srgbClr val="eeeeee"/>
-              </a:solidFill>
               <a:latin typeface="Arial"/>
             </a:endParaRPr>
           </a:p>
@@ -8908,9 +8986,6 @@
               <a:t>5. Функционал</a:t>
             </a:r>
             <a:endParaRPr b="0" lang="ru-RU" sz="4400" spc="-1" strike="noStrike">
-              <a:solidFill>
-                <a:srgbClr val="eeeeee"/>
-              </a:solidFill>
               <a:latin typeface="Arial"/>
             </a:endParaRPr>
           </a:p>
@@ -9014,9 +9089,6 @@
               <a:t>альбома</a:t>
             </a:r>
             <a:endParaRPr b="0" lang="ru-RU" sz="3200" spc="-1" strike="noStrike">
-              <a:solidFill>
-                <a:srgbClr val="eeeeee"/>
-              </a:solidFill>
               <a:latin typeface="Arial"/>
             </a:endParaRPr>
           </a:p>
@@ -9056,9 +9128,6 @@
               <a:t>Прослушивание</a:t>
             </a:r>
             <a:endParaRPr b="0" lang="ru-RU" sz="3200" spc="-1" strike="noStrike">
-              <a:solidFill>
-                <a:srgbClr val="eeeeee"/>
-              </a:solidFill>
               <a:latin typeface="Arial"/>
             </a:endParaRPr>
           </a:p>
@@ -9128,9 +9197,6 @@
               <a:t>Редактор профиля</a:t>
             </a:r>
             <a:endParaRPr b="0" lang="ru-RU" sz="3200" spc="-1" strike="noStrike">
-              <a:solidFill>
-                <a:srgbClr val="eeeeee"/>
-              </a:solidFill>
               <a:latin typeface="Arial"/>
             </a:endParaRPr>
           </a:p>
@@ -9216,9 +9282,6 @@
               <a:t>Страница пользователя</a:t>
             </a:r>
             <a:endParaRPr b="0" lang="ru-RU" sz="3200" spc="-1" strike="noStrike">
-              <a:solidFill>
-                <a:srgbClr val="eeeeee"/>
-              </a:solidFill>
               <a:latin typeface="Arial"/>
             </a:endParaRPr>
           </a:p>
@@ -9344,11 +9407,17 @@
             </a:pPr>
             <a:r>
               <a:rPr b="0" lang="ru-RU" sz="4400" spc="-1" strike="noStrike">
+                <a:solidFill>
+                  <a:srgbClr val="eeeeee"/>
+                </a:solidFill>
                 <a:latin typeface="Arial"/>
               </a:rPr>
               <a:t>7. Использованные технологии</a:t>
             </a:r>
             <a:endParaRPr b="0" lang="ru-RU" sz="4400" spc="-1" strike="noStrike">
+              <a:solidFill>
+                <a:srgbClr val="eeeeee"/>
+              </a:solidFill>
               <a:latin typeface="Arial"/>
             </a:endParaRPr>
           </a:p>
@@ -9400,11 +9469,17 @@
             </a:pPr>
             <a:r>
               <a:rPr b="0" lang="ru-RU" sz="2200" spc="-1" strike="noStrike">
+                <a:solidFill>
+                  <a:srgbClr val="eeeeee"/>
+                </a:solidFill>
                 <a:latin typeface="Arial"/>
               </a:rPr>
               <a:t>PyQT5, для графического интерфейса программы.</a:t>
             </a:r>
             <a:endParaRPr b="0" lang="ru-RU" sz="2200" spc="-1" strike="noStrike">
+              <a:solidFill>
+                <a:srgbClr val="eeeeee"/>
+              </a:solidFill>
               <a:latin typeface="Arial"/>
             </a:endParaRPr>
           </a:p>
@@ -9425,11 +9500,17 @@
             </a:pPr>
             <a:r>
               <a:rPr b="0" lang="ru-RU" sz="2200" spc="-1" strike="noStrike">
+                <a:solidFill>
+                  <a:srgbClr val="eeeeee"/>
+                </a:solidFill>
                 <a:latin typeface="Arial"/>
               </a:rPr>
               <a:t>СУБД Sqlite, для сохранения данных и последующего их использования.</a:t>
             </a:r>
             <a:endParaRPr b="0" lang="ru-RU" sz="2200" spc="-1" strike="noStrike">
+              <a:solidFill>
+                <a:srgbClr val="eeeeee"/>
+              </a:solidFill>
               <a:latin typeface="Arial"/>
             </a:endParaRPr>
           </a:p>
@@ -9450,11 +9531,17 @@
             </a:pPr>
             <a:r>
               <a:rPr b="0" lang="ru-RU" sz="2200" spc="-1" strike="noStrike">
+                <a:solidFill>
+                  <a:srgbClr val="eeeeee"/>
+                </a:solidFill>
                 <a:latin typeface="Arial"/>
               </a:rPr>
               <a:t>QTMultimedia, для проигрывания музыки.</a:t>
             </a:r>
             <a:endParaRPr b="0" lang="ru-RU" sz="2200" spc="-1" strike="noStrike">
+              <a:solidFill>
+                <a:srgbClr val="eeeeee"/>
+              </a:solidFill>
               <a:latin typeface="Arial"/>
             </a:endParaRPr>
           </a:p>
@@ -9475,11 +9562,17 @@
             </a:pPr>
             <a:r>
               <a:rPr b="0" lang="ru-RU" sz="2200" spc="-1" strike="noStrike">
+                <a:solidFill>
+                  <a:srgbClr val="eeeeee"/>
+                </a:solidFill>
                 <a:latin typeface="Arial"/>
               </a:rPr>
               <a:t>QT Designer, для верстки окон.</a:t>
             </a:r>
             <a:endParaRPr b="0" lang="ru-RU" sz="2200" spc="-1" strike="noStrike">
+              <a:solidFill>
+                <a:srgbClr val="eeeeee"/>
+              </a:solidFill>
               <a:latin typeface="Arial"/>
             </a:endParaRPr>
           </a:p>
@@ -9552,11 +9645,17 @@
             </a:pPr>
             <a:r>
               <a:rPr b="0" lang="ru-RU" sz="4400" spc="-1" strike="noStrike">
+                <a:solidFill>
+                  <a:srgbClr val="eeeeee"/>
+                </a:solidFill>
                 <a:latin typeface="Arial"/>
               </a:rPr>
               <a:t>8. Структура</a:t>
             </a:r>
             <a:endParaRPr b="0" lang="ru-RU" sz="4400" spc="-1" strike="noStrike">
+              <a:solidFill>
+                <a:srgbClr val="eeeeee"/>
+              </a:solidFill>
               <a:latin typeface="Arial"/>
             </a:endParaRPr>
           </a:p>
@@ -9608,11 +9707,17 @@
             </a:pPr>
             <a:r>
               <a:rPr b="0" lang="ru-RU" sz="3200" spc="-1" strike="noStrike">
+                <a:solidFill>
+                  <a:srgbClr val="eeeeee"/>
+                </a:solidFill>
                 <a:latin typeface="Arial"/>
               </a:rPr>
               <a:t>Проект разделен на две части: frontend — код, предназначенный для взаимодействия с пользователем (Всеобразные виджеты, окна), и backend — то, как все работает под капотом (Управление БД, API). У каждого класса своя обязанность. Классы, отвечающий за интерфейс не выполняют запросы БД самостоятельно.</a:t>
             </a:r>
             <a:endParaRPr b="0" lang="ru-RU" sz="3200" spc="-1" strike="noStrike">
+              <a:solidFill>
+                <a:srgbClr val="eeeeee"/>
+              </a:solidFill>
               <a:latin typeface="Arial"/>
             </a:endParaRPr>
           </a:p>
@@ -9626,6 +9731,9 @@
               </a:spcBef>
             </a:pPr>
             <a:endParaRPr b="0" lang="ru-RU" sz="3200" spc="-1" strike="noStrike">
+              <a:solidFill>
+                <a:srgbClr val="eeeeee"/>
+              </a:solidFill>
               <a:latin typeface="Arial"/>
             </a:endParaRPr>
           </a:p>

</xml_diff>

<commit_message>
remove useless imports + finally fix presentation
</commit_message>
<xml_diff>
--- a/media/presentation.pptx
+++ b/media/presentation.pptx
@@ -4154,7 +4154,7 @@
                 <a:spcPct val="100000"/>
               </a:lnSpc>
             </a:pPr>
-            <a:fld id="{5F17335E-5DC9-41DB-846F-ED800A5E11B2}" type="author">
+            <a:fld id="{A4F32E3E-330A-46CD-BD78-FB1585704A56}" type="author">
               <a:rPr b="0" lang="ru-RU" sz="1800" spc="-1" strike="noStrike">
                 <a:solidFill>
                   <a:srgbClr val="eeeeee"/>
@@ -4621,7 +4621,7 @@
         </p:spPr>
         <p:txBody>
           <a:bodyPr lIns="0" rIns="0" tIns="0" bIns="0">
-            <a:normAutofit fontScale="65000"/>
+            <a:normAutofit fontScale="71000"/>
           </a:bodyPr>
           <a:p>
             <a:pPr marL="432000" indent="-324000">
@@ -4800,7 +4800,7 @@
         </p:spPr>
         <p:txBody>
           <a:bodyPr lIns="0" rIns="0" tIns="0" bIns="0">
-            <a:normAutofit fontScale="65000"/>
+            <a:normAutofit fontScale="71000"/>
           </a:bodyPr>
           <a:p>
             <a:pPr marL="432000" indent="-324000">
@@ -7499,11 +7499,17 @@
           <a:p>
             <a:r>
               <a:rPr b="0" lang="ru-RU" sz="4400" spc="-1" strike="noStrike">
+                <a:solidFill>
+                  <a:srgbClr val="eeeeee"/>
+                </a:solidFill>
                 <a:latin typeface="Arial"/>
               </a:rPr>
               <a:t>10. Структура БД</a:t>
             </a:r>
             <a:endParaRPr b="0" lang="ru-RU" sz="4400" spc="-1" strike="noStrike">
+              <a:solidFill>
+                <a:srgbClr val="eeeeee"/>
+              </a:solidFill>
               <a:latin typeface="Arial"/>
             </a:endParaRPr>
           </a:p>
@@ -7535,6 +7541,9 @@
           <a:p>
             <a:r>
               <a:rPr b="0" lang="ru-RU" sz="2400" spc="-1" strike="noStrike">
+                <a:solidFill>
+                  <a:srgbClr val="eeeeee"/>
+                </a:solidFill>
                 <a:latin typeface="Arial"/>
                 <a:ea typeface="Source Han Sans CN"/>
               </a:rPr>
@@ -7558,6 +7567,9 @@
             </a:pPr>
             <a:r>
               <a:rPr b="0" lang="ru-RU" sz="2400" spc="-1" strike="noStrike">
+                <a:solidFill>
+                  <a:srgbClr val="eeeeee"/>
+                </a:solidFill>
                 <a:latin typeface="Arial"/>
                 <a:ea typeface="Source Han Sans CN"/>
               </a:rPr>
@@ -7581,6 +7593,9 @@
             </a:pPr>
             <a:r>
               <a:rPr b="0" lang="ru-RU" sz="2400" spc="-1" strike="noStrike">
+                <a:solidFill>
+                  <a:srgbClr val="eeeeee"/>
+                </a:solidFill>
                 <a:latin typeface="Arial"/>
                 <a:ea typeface="Source Han Sans CN"/>
               </a:rPr>
@@ -7604,6 +7619,9 @@
             </a:pPr>
             <a:r>
               <a:rPr b="0" lang="ru-RU" sz="2400" spc="-1" strike="noStrike">
+                <a:solidFill>
+                  <a:srgbClr val="eeeeee"/>
+                </a:solidFill>
                 <a:latin typeface="Arial"/>
                 <a:ea typeface="Source Han Sans CN"/>
               </a:rPr>
@@ -7627,6 +7645,9 @@
             </a:pPr>
             <a:r>
               <a:rPr b="0" lang="ru-RU" sz="2400" spc="-1" strike="noStrike">
+                <a:solidFill>
+                  <a:srgbClr val="eeeeee"/>
+                </a:solidFill>
                 <a:latin typeface="Arial"/>
                 <a:ea typeface="Source Han Sans CN"/>
               </a:rPr>
@@ -7699,11 +7720,17 @@
           <a:p>
             <a:r>
               <a:rPr b="0" lang="ru-RU" sz="4400" spc="-1" strike="noStrike">
+                <a:solidFill>
+                  <a:srgbClr val="eeeeee"/>
+                </a:solidFill>
                 <a:latin typeface="Arial"/>
               </a:rPr>
               <a:t>11. Структура БД</a:t>
             </a:r>
             <a:endParaRPr b="0" lang="ru-RU" sz="4400" spc="-1" strike="noStrike">
+              <a:solidFill>
+                <a:srgbClr val="eeeeee"/>
+              </a:solidFill>
               <a:latin typeface="Arial"/>
             </a:endParaRPr>
           </a:p>
@@ -7746,6 +7773,9 @@
             </a:pPr>
             <a:r>
               <a:rPr b="0" lang="ru-RU" sz="1200" spc="-1" strike="noStrike">
+                <a:solidFill>
+                  <a:srgbClr val="eeeeee"/>
+                </a:solidFill>
                 <a:latin typeface="Arial"/>
               </a:rPr>
               <a:t>Все таблицы связаны между собой.</a:t>
@@ -7753,12 +7783,18 @@
             <a:br/>
             <a:r>
               <a:rPr b="0" lang="ru-RU" sz="1200" spc="-1" strike="noStrike">
+                <a:solidFill>
+                  <a:srgbClr val="eeeeee"/>
+                </a:solidFill>
                 <a:latin typeface="Arial"/>
                 <a:ea typeface="Source Han Sans CN"/>
               </a:rPr>
               <a:t>user_id в таблице albums указывает на пользователя, загрузишего альбом, album_id в таблице songs указывает на альбом песни, а genre в albums — на id жанра альбома.</a:t>
             </a:r>
             <a:endParaRPr b="0" lang="ru-RU" sz="1200" spc="-1" strike="noStrike">
+              <a:solidFill>
+                <a:srgbClr val="eeeeee"/>
+              </a:solidFill>
               <a:latin typeface="Arial"/>
             </a:endParaRPr>
           </a:p>
@@ -7844,11 +7880,17 @@
           <a:p>
             <a:r>
               <a:rPr b="0" lang="ru-RU" sz="4400" spc="-1" strike="noStrike">
+                <a:solidFill>
+                  <a:srgbClr val="eeeeee"/>
+                </a:solidFill>
                 <a:latin typeface="Arial"/>
               </a:rPr>
               <a:t>12. Выводы</a:t>
             </a:r>
             <a:endParaRPr b="0" lang="ru-RU" sz="4400" spc="-1" strike="noStrike">
+              <a:solidFill>
+                <a:srgbClr val="eeeeee"/>
+              </a:solidFill>
               <a:latin typeface="Arial"/>
             </a:endParaRPr>
           </a:p>
@@ -7891,11 +7933,17 @@
             </a:pPr>
             <a:r>
               <a:rPr b="0" lang="ru-RU" sz="1600" spc="-1" strike="noStrike">
+                <a:solidFill>
+                  <a:srgbClr val="eeeeee"/>
+                </a:solidFill>
                 <a:latin typeface="Arial"/>
               </a:rPr>
               <a:t>Я разработал первый рабочий прототип программы. Это был очень интересный опыт, и я узнал много нового в процессе создания, и у меня есть планы на проект в будущем.</a:t>
             </a:r>
             <a:endParaRPr b="0" lang="ru-RU" sz="1600" spc="-1" strike="noStrike">
+              <a:solidFill>
+                <a:srgbClr val="eeeeee"/>
+              </a:solidFill>
               <a:latin typeface="Arial"/>
             </a:endParaRPr>
           </a:p>
@@ -7913,11 +7961,17 @@
             </a:pPr>
             <a:r>
               <a:rPr b="0" lang="ru-RU" sz="1600" spc="-1" strike="noStrike">
+                <a:solidFill>
+                  <a:srgbClr val="eeeeee"/>
+                </a:solidFill>
                 <a:latin typeface="Arial"/>
               </a:rPr>
               <a:t>Я хочу добавить и реализовать:</a:t>
             </a:r>
             <a:endParaRPr b="0" lang="ru-RU" sz="1600" spc="-1" strike="noStrike">
+              <a:solidFill>
+                <a:srgbClr val="eeeeee"/>
+              </a:solidFill>
               <a:latin typeface="Arial"/>
             </a:endParaRPr>
           </a:p>
@@ -7935,11 +7989,17 @@
             </a:pPr>
             <a:r>
               <a:rPr b="0" lang="ru-RU" sz="1600" spc="-1" strike="noStrike">
+                <a:solidFill>
+                  <a:srgbClr val="eeeeee"/>
+                </a:solidFill>
                 <a:latin typeface="Arial"/>
               </a:rPr>
               <a:t>Возможность использовать программу на сервере. Разделить серверную и клиентскую часть кода.</a:t>
             </a:r>
             <a:endParaRPr b="0" lang="ru-RU" sz="1600" spc="-1" strike="noStrike">
+              <a:solidFill>
+                <a:srgbClr val="eeeeee"/>
+              </a:solidFill>
               <a:latin typeface="Arial"/>
             </a:endParaRPr>
           </a:p>
@@ -7957,11 +8017,17 @@
             </a:pPr>
             <a:r>
               <a:rPr b="0" lang="ru-RU" sz="1600" spc="-1" strike="noStrike">
+                <a:solidFill>
+                  <a:srgbClr val="eeeeee"/>
+                </a:solidFill>
                 <a:latin typeface="Arial"/>
               </a:rPr>
               <a:t>Более функциональную и безопасную авторизацию. Восстановление доступа, хеширование паролей.</a:t>
             </a:r>
             <a:endParaRPr b="0" lang="ru-RU" sz="1600" spc="-1" strike="noStrike">
+              <a:solidFill>
+                <a:srgbClr val="eeeeee"/>
+              </a:solidFill>
               <a:latin typeface="Arial"/>
             </a:endParaRPr>
           </a:p>
@@ -7979,11 +8045,17 @@
             </a:pPr>
             <a:r>
               <a:rPr b="0" lang="ru-RU" sz="1600" spc="-1" strike="noStrike">
+                <a:solidFill>
+                  <a:srgbClr val="eeeeee"/>
+                </a:solidFill>
                 <a:latin typeface="Arial"/>
               </a:rPr>
               <a:t>Больше способов взаимодействия для пользователей: подписки, лайки, комментарии, блокировки.</a:t>
             </a:r>
             <a:endParaRPr b="0" lang="ru-RU" sz="1600" spc="-1" strike="noStrike">
+              <a:solidFill>
+                <a:srgbClr val="eeeeee"/>
+              </a:solidFill>
               <a:latin typeface="Arial"/>
             </a:endParaRPr>
           </a:p>
@@ -8001,11 +8073,17 @@
             </a:pPr>
             <a:r>
               <a:rPr b="0" lang="ru-RU" sz="1600" spc="-1" strike="noStrike">
+                <a:solidFill>
+                  <a:srgbClr val="eeeeee"/>
+                </a:solidFill>
                 <a:latin typeface="Arial"/>
               </a:rPr>
               <a:t>Глобальный поиск пользователей, альбомов и отдельных песен по фильтрам.</a:t>
             </a:r>
             <a:endParaRPr b="0" lang="ru-RU" sz="1600" spc="-1" strike="noStrike">
+              <a:solidFill>
+                <a:srgbClr val="eeeeee"/>
+              </a:solidFill>
               <a:latin typeface="Arial"/>
             </a:endParaRPr>
           </a:p>
@@ -8120,6 +8198,9 @@
             <a:pPr algn="ctr"/>
             <a:r>
               <a:rPr b="0" lang="ru-RU" sz="4400" spc="-1" strike="noStrike">
+                <a:solidFill>
+                  <a:srgbClr val="eeeeee"/>
+                </a:solidFill>
                 <a:latin typeface="Arial"/>
               </a:rPr>
               <a:t>Спасибо за внимание!</a:t>
@@ -8127,6 +8208,9 @@
             <a:br/>
             <a:r>
               <a:rPr b="0" lang="ru-RU" sz="1600" spc="-1" strike="noStrike">
+                <a:solidFill>
+                  <a:srgbClr val="eeeeee"/>
+                </a:solidFill>
                 <a:latin typeface="Arial"/>
               </a:rPr>
               <a:t>слушайте хорошую музыку :)</a:t>

</xml_diff>